<commit_message>
Pataisymai dieną prieš pristatymą
</commit_message>
<xml_diff>
--- a/Straipsnis/Pristatymas.pptx
+++ b/Straipsnis/Pristatymas.pptx
@@ -11770,7 +11770,7 @@
                                         </m:sSubPr>
                                         <m:e>
                                           <m:r>
-                                            <a:rPr lang="lt-LT" sz="1800" i="1">
+                                            <a:rPr lang="lt-LT" sz="1800" i="1" smtClean="0">
                                               <a:solidFill>
                                                 <a:schemeClr val="accent3"/>
                                               </a:solidFill>
@@ -12637,8 +12637,8 @@
           </a:p>
         </p:txBody>
       </p:sp>
-      <mc:AlternateContent xmlns:mc="http://schemas.openxmlformats.org/markup-compatibility/2006" xmlns:a14="http://schemas.microsoft.com/office/drawing/2010/main">
-        <mc:Choice Requires="a14">
+      <mc:AlternateContent xmlns:mc="http://schemas.openxmlformats.org/markup-compatibility/2006">
+        <mc:Choice xmlns:a14="http://schemas.microsoft.com/office/drawing/2010/main" Requires="a14">
           <p:sp>
             <p:nvSpPr>
               <p:cNvPr id="12" name="TextBox 11">
@@ -12739,14 +12739,14 @@
                       <m:rPr>
                         <m:sty m:val="p"/>
                       </m:rPr>
-                      <a:rPr lang="lt-LT" b="0" i="0" smtClean="0">
+                      <a:rPr lang="en-US" b="0" i="0" smtClean="0">
                         <a:solidFill>
                           <a:schemeClr val="accent3"/>
                         </a:solidFill>
                         <a:effectLst/>
                         <a:latin typeface="Cambria Math" panose="02040503050406030204" pitchFamily="18" charset="0"/>
                       </a:rPr>
-                      <m:t>maksimalus</m:t>
+                      <m:t>galimas</m:t>
                     </m:r>
                     <m:r>
                       <a:rPr lang="lt-LT" b="0" i="0" smtClean="0">
@@ -12819,7 +12819,7 @@
             </p:txBody>
           </p:sp>
         </mc:Choice>
-        <mc:Fallback xmlns="">
+        <mc:Fallback>
           <p:sp>
             <p:nvSpPr>
               <p:cNvPr id="12" name="TextBox 11">

</xml_diff>